<commit_message>
Changed some diagrams for display purposes, added some images and did a but to the PPT
</commit_message>
<xml_diff>
--- a/Documents/Design review PPT.pptx
+++ b/Documents/Design review PPT.pptx
@@ -6,8 +6,20 @@
   </p:sldMasterIdLst>
   <p:sldIdLst>
     <p:sldId id="256" r:id="rId2"/>
-    <p:sldId id="257" r:id="rId3"/>
-    <p:sldId id="258" r:id="rId4"/>
+    <p:sldId id="260" r:id="rId3"/>
+    <p:sldId id="261" r:id="rId4"/>
+    <p:sldId id="257" r:id="rId5"/>
+    <p:sldId id="258" r:id="rId6"/>
+    <p:sldId id="259" r:id="rId7"/>
+    <p:sldId id="269" r:id="rId8"/>
+    <p:sldId id="270" r:id="rId9"/>
+    <p:sldId id="271" r:id="rId10"/>
+    <p:sldId id="262" r:id="rId11"/>
+    <p:sldId id="264" r:id="rId12"/>
+    <p:sldId id="265" r:id="rId13"/>
+    <p:sldId id="266" r:id="rId14"/>
+    <p:sldId id="267" r:id="rId15"/>
+    <p:sldId id="268" r:id="rId16"/>
   </p:sldIdLst>
   <p:sldSz cx="9144000" cy="6858000" type="screen4x3"/>
   <p:notesSz cx="6858000" cy="9144000"/>
@@ -290,7 +302,8 @@
           <a:p>
             <a:fld id="{6B65C960-0237-455E-AA9D-7CD652548A2A}" type="datetimeFigureOut">
               <a:rPr lang="en-US" smtClean="0"/>
-              <a:t>10/14/2010</a:t>
+              <a:pPr/>
+              <a:t>10/15/2010</a:t>
             </a:fld>
             <a:endParaRPr lang="en-US"/>
           </a:p>
@@ -332,6 +345,7 @@
           <a:p>
             <a:fld id="{F8255D62-F3DE-4BFB-895D-7196D82DDBF1}" type="slidenum">
               <a:rPr lang="en-US" smtClean="0"/>
+              <a:pPr/>
               <a:t>‹#›</a:t>
             </a:fld>
             <a:endParaRPr lang="en-US"/>
@@ -341,7 +355,7 @@
     </p:spTree>
     <p:extLst>
       <p:ext uri="{BB962C8B-B14F-4D97-AF65-F5344CB8AC3E}">
-        <p14:creationId xmlns:p14="http://schemas.microsoft.com/office/powerpoint/2010/main" val="1939373705"/>
+        <p14:creationId xmlns:p14="http://schemas.microsoft.com/office/powerpoint/2010/main" xmlns="" val="1939373705"/>
       </p:ext>
     </p:extLst>
   </p:cSld>
@@ -460,7 +474,8 @@
           <a:p>
             <a:fld id="{6B65C960-0237-455E-AA9D-7CD652548A2A}" type="datetimeFigureOut">
               <a:rPr lang="en-US" smtClean="0"/>
-              <a:t>10/14/2010</a:t>
+              <a:pPr/>
+              <a:t>10/15/2010</a:t>
             </a:fld>
             <a:endParaRPr lang="en-US"/>
           </a:p>
@@ -502,6 +517,7 @@
           <a:p>
             <a:fld id="{F8255D62-F3DE-4BFB-895D-7196D82DDBF1}" type="slidenum">
               <a:rPr lang="en-US" smtClean="0"/>
+              <a:pPr/>
               <a:t>‹#›</a:t>
             </a:fld>
             <a:endParaRPr lang="en-US"/>
@@ -511,7 +527,7 @@
     </p:spTree>
     <p:extLst>
       <p:ext uri="{BB962C8B-B14F-4D97-AF65-F5344CB8AC3E}">
-        <p14:creationId xmlns:p14="http://schemas.microsoft.com/office/powerpoint/2010/main" val="3367227873"/>
+        <p14:creationId xmlns:p14="http://schemas.microsoft.com/office/powerpoint/2010/main" xmlns="" val="3367227873"/>
       </p:ext>
     </p:extLst>
   </p:cSld>
@@ -640,7 +656,8 @@
           <a:p>
             <a:fld id="{6B65C960-0237-455E-AA9D-7CD652548A2A}" type="datetimeFigureOut">
               <a:rPr lang="en-US" smtClean="0"/>
-              <a:t>10/14/2010</a:t>
+              <a:pPr/>
+              <a:t>10/15/2010</a:t>
             </a:fld>
             <a:endParaRPr lang="en-US"/>
           </a:p>
@@ -682,6 +699,7 @@
           <a:p>
             <a:fld id="{F8255D62-F3DE-4BFB-895D-7196D82DDBF1}" type="slidenum">
               <a:rPr lang="en-US" smtClean="0"/>
+              <a:pPr/>
               <a:t>‹#›</a:t>
             </a:fld>
             <a:endParaRPr lang="en-US"/>
@@ -691,7 +709,7 @@
     </p:spTree>
     <p:extLst>
       <p:ext uri="{BB962C8B-B14F-4D97-AF65-F5344CB8AC3E}">
-        <p14:creationId xmlns:p14="http://schemas.microsoft.com/office/powerpoint/2010/main" val="1922334358"/>
+        <p14:creationId xmlns:p14="http://schemas.microsoft.com/office/powerpoint/2010/main" xmlns="" val="1922334358"/>
       </p:ext>
     </p:extLst>
   </p:cSld>
@@ -810,7 +828,8 @@
           <a:p>
             <a:fld id="{6B65C960-0237-455E-AA9D-7CD652548A2A}" type="datetimeFigureOut">
               <a:rPr lang="en-US" smtClean="0"/>
-              <a:t>10/14/2010</a:t>
+              <a:pPr/>
+              <a:t>10/15/2010</a:t>
             </a:fld>
             <a:endParaRPr lang="en-US"/>
           </a:p>
@@ -852,6 +871,7 @@
           <a:p>
             <a:fld id="{F8255D62-F3DE-4BFB-895D-7196D82DDBF1}" type="slidenum">
               <a:rPr lang="en-US" smtClean="0"/>
+              <a:pPr/>
               <a:t>‹#›</a:t>
             </a:fld>
             <a:endParaRPr lang="en-US"/>
@@ -861,7 +881,7 @@
     </p:spTree>
     <p:extLst>
       <p:ext uri="{BB962C8B-B14F-4D97-AF65-F5344CB8AC3E}">
-        <p14:creationId xmlns:p14="http://schemas.microsoft.com/office/powerpoint/2010/main" val="3553958039"/>
+        <p14:creationId xmlns:p14="http://schemas.microsoft.com/office/powerpoint/2010/main" xmlns="" val="3553958039"/>
       </p:ext>
     </p:extLst>
   </p:cSld>
@@ -1056,7 +1076,8 @@
           <a:p>
             <a:fld id="{6B65C960-0237-455E-AA9D-7CD652548A2A}" type="datetimeFigureOut">
               <a:rPr lang="en-US" smtClean="0"/>
-              <a:t>10/14/2010</a:t>
+              <a:pPr/>
+              <a:t>10/15/2010</a:t>
             </a:fld>
             <a:endParaRPr lang="en-US"/>
           </a:p>
@@ -1098,6 +1119,7 @@
           <a:p>
             <a:fld id="{F8255D62-F3DE-4BFB-895D-7196D82DDBF1}" type="slidenum">
               <a:rPr lang="en-US" smtClean="0"/>
+              <a:pPr/>
               <a:t>‹#›</a:t>
             </a:fld>
             <a:endParaRPr lang="en-US"/>
@@ -1107,7 +1129,7 @@
     </p:spTree>
     <p:extLst>
       <p:ext uri="{BB962C8B-B14F-4D97-AF65-F5344CB8AC3E}">
-        <p14:creationId xmlns:p14="http://schemas.microsoft.com/office/powerpoint/2010/main" val="572856973"/>
+        <p14:creationId xmlns:p14="http://schemas.microsoft.com/office/powerpoint/2010/main" xmlns="" val="572856973"/>
       </p:ext>
     </p:extLst>
   </p:cSld>
@@ -1344,7 +1366,8 @@
           <a:p>
             <a:fld id="{6B65C960-0237-455E-AA9D-7CD652548A2A}" type="datetimeFigureOut">
               <a:rPr lang="en-US" smtClean="0"/>
-              <a:t>10/14/2010</a:t>
+              <a:pPr/>
+              <a:t>10/15/2010</a:t>
             </a:fld>
             <a:endParaRPr lang="en-US"/>
           </a:p>
@@ -1386,6 +1409,7 @@
           <a:p>
             <a:fld id="{F8255D62-F3DE-4BFB-895D-7196D82DDBF1}" type="slidenum">
               <a:rPr lang="en-US" smtClean="0"/>
+              <a:pPr/>
               <a:t>‹#›</a:t>
             </a:fld>
             <a:endParaRPr lang="en-US"/>
@@ -1395,7 +1419,7 @@
     </p:spTree>
     <p:extLst>
       <p:ext uri="{BB962C8B-B14F-4D97-AF65-F5344CB8AC3E}">
-        <p14:creationId xmlns:p14="http://schemas.microsoft.com/office/powerpoint/2010/main" val="2159093841"/>
+        <p14:creationId xmlns:p14="http://schemas.microsoft.com/office/powerpoint/2010/main" xmlns="" val="2159093841"/>
       </p:ext>
     </p:extLst>
   </p:cSld>
@@ -1766,7 +1790,8 @@
           <a:p>
             <a:fld id="{6B65C960-0237-455E-AA9D-7CD652548A2A}" type="datetimeFigureOut">
               <a:rPr lang="en-US" smtClean="0"/>
-              <a:t>10/14/2010</a:t>
+              <a:pPr/>
+              <a:t>10/15/2010</a:t>
             </a:fld>
             <a:endParaRPr lang="en-US"/>
           </a:p>
@@ -1808,6 +1833,7 @@
           <a:p>
             <a:fld id="{F8255D62-F3DE-4BFB-895D-7196D82DDBF1}" type="slidenum">
               <a:rPr lang="en-US" smtClean="0"/>
+              <a:pPr/>
               <a:t>‹#›</a:t>
             </a:fld>
             <a:endParaRPr lang="en-US"/>
@@ -1817,7 +1843,7 @@
     </p:spTree>
     <p:extLst>
       <p:ext uri="{BB962C8B-B14F-4D97-AF65-F5344CB8AC3E}">
-        <p14:creationId xmlns:p14="http://schemas.microsoft.com/office/powerpoint/2010/main" val="944408720"/>
+        <p14:creationId xmlns:p14="http://schemas.microsoft.com/office/powerpoint/2010/main" xmlns="" val="944408720"/>
       </p:ext>
     </p:extLst>
   </p:cSld>
@@ -1884,7 +1910,8 @@
           <a:p>
             <a:fld id="{6B65C960-0237-455E-AA9D-7CD652548A2A}" type="datetimeFigureOut">
               <a:rPr lang="en-US" smtClean="0"/>
-              <a:t>10/14/2010</a:t>
+              <a:pPr/>
+              <a:t>10/15/2010</a:t>
             </a:fld>
             <a:endParaRPr lang="en-US"/>
           </a:p>
@@ -1926,6 +1953,7 @@
           <a:p>
             <a:fld id="{F8255D62-F3DE-4BFB-895D-7196D82DDBF1}" type="slidenum">
               <a:rPr lang="en-US" smtClean="0"/>
+              <a:pPr/>
               <a:t>‹#›</a:t>
             </a:fld>
             <a:endParaRPr lang="en-US"/>
@@ -1935,7 +1963,7 @@
     </p:spTree>
     <p:extLst>
       <p:ext uri="{BB962C8B-B14F-4D97-AF65-F5344CB8AC3E}">
-        <p14:creationId xmlns:p14="http://schemas.microsoft.com/office/powerpoint/2010/main" val="1869401353"/>
+        <p14:creationId xmlns:p14="http://schemas.microsoft.com/office/powerpoint/2010/main" xmlns="" val="1869401353"/>
       </p:ext>
     </p:extLst>
   </p:cSld>
@@ -1979,7 +2007,8 @@
           <a:p>
             <a:fld id="{6B65C960-0237-455E-AA9D-7CD652548A2A}" type="datetimeFigureOut">
               <a:rPr lang="en-US" smtClean="0"/>
-              <a:t>10/14/2010</a:t>
+              <a:pPr/>
+              <a:t>10/15/2010</a:t>
             </a:fld>
             <a:endParaRPr lang="en-US"/>
           </a:p>
@@ -2021,6 +2050,7 @@
           <a:p>
             <a:fld id="{F8255D62-F3DE-4BFB-895D-7196D82DDBF1}" type="slidenum">
               <a:rPr lang="en-US" smtClean="0"/>
+              <a:pPr/>
               <a:t>‹#›</a:t>
             </a:fld>
             <a:endParaRPr lang="en-US"/>
@@ -2030,7 +2060,7 @@
     </p:spTree>
     <p:extLst>
       <p:ext uri="{BB962C8B-B14F-4D97-AF65-F5344CB8AC3E}">
-        <p14:creationId xmlns:p14="http://schemas.microsoft.com/office/powerpoint/2010/main" val="883625862"/>
+        <p14:creationId xmlns:p14="http://schemas.microsoft.com/office/powerpoint/2010/main" xmlns="" val="883625862"/>
       </p:ext>
     </p:extLst>
   </p:cSld>
@@ -2256,7 +2286,8 @@
           <a:p>
             <a:fld id="{6B65C960-0237-455E-AA9D-7CD652548A2A}" type="datetimeFigureOut">
               <a:rPr lang="en-US" smtClean="0"/>
-              <a:t>10/14/2010</a:t>
+              <a:pPr/>
+              <a:t>10/15/2010</a:t>
             </a:fld>
             <a:endParaRPr lang="en-US"/>
           </a:p>
@@ -2298,6 +2329,7 @@
           <a:p>
             <a:fld id="{F8255D62-F3DE-4BFB-895D-7196D82DDBF1}" type="slidenum">
               <a:rPr lang="en-US" smtClean="0"/>
+              <a:pPr/>
               <a:t>‹#›</a:t>
             </a:fld>
             <a:endParaRPr lang="en-US"/>
@@ -2307,7 +2339,7 @@
     </p:spTree>
     <p:extLst>
       <p:ext uri="{BB962C8B-B14F-4D97-AF65-F5344CB8AC3E}">
-        <p14:creationId xmlns:p14="http://schemas.microsoft.com/office/powerpoint/2010/main" val="3627303978"/>
+        <p14:creationId xmlns:p14="http://schemas.microsoft.com/office/powerpoint/2010/main" xmlns="" val="3627303978"/>
       </p:ext>
     </p:extLst>
   </p:cSld>
@@ -2509,7 +2541,8 @@
           <a:p>
             <a:fld id="{6B65C960-0237-455E-AA9D-7CD652548A2A}" type="datetimeFigureOut">
               <a:rPr lang="en-US" smtClean="0"/>
-              <a:t>10/14/2010</a:t>
+              <a:pPr/>
+              <a:t>10/15/2010</a:t>
             </a:fld>
             <a:endParaRPr lang="en-US"/>
           </a:p>
@@ -2551,6 +2584,7 @@
           <a:p>
             <a:fld id="{F8255D62-F3DE-4BFB-895D-7196D82DDBF1}" type="slidenum">
               <a:rPr lang="en-US" smtClean="0"/>
+              <a:pPr/>
               <a:t>‹#›</a:t>
             </a:fld>
             <a:endParaRPr lang="en-US"/>
@@ -2560,7 +2594,7 @@
     </p:spTree>
     <p:extLst>
       <p:ext uri="{BB962C8B-B14F-4D97-AF65-F5344CB8AC3E}">
-        <p14:creationId xmlns:p14="http://schemas.microsoft.com/office/powerpoint/2010/main" val="2673529943"/>
+        <p14:creationId xmlns:p14="http://schemas.microsoft.com/office/powerpoint/2010/main" xmlns="" val="2673529943"/>
       </p:ext>
     </p:extLst>
   </p:cSld>
@@ -2734,7 +2768,8 @@
           <a:p>
             <a:fld id="{6B65C960-0237-455E-AA9D-7CD652548A2A}" type="datetimeFigureOut">
               <a:rPr lang="en-US" smtClean="0"/>
-              <a:t>10/14/2010</a:t>
+              <a:pPr/>
+              <a:t>10/15/2010</a:t>
             </a:fld>
             <a:endParaRPr lang="en-US"/>
           </a:p>
@@ -2812,6 +2847,7 @@
           <a:p>
             <a:fld id="{F8255D62-F3DE-4BFB-895D-7196D82DDBF1}" type="slidenum">
               <a:rPr lang="en-US" smtClean="0"/>
+              <a:pPr/>
               <a:t>‹#›</a:t>
             </a:fld>
             <a:endParaRPr lang="en-US"/>
@@ -2821,7 +2857,7 @@
     </p:spTree>
     <p:extLst>
       <p:ext uri="{BB962C8B-B14F-4D97-AF65-F5344CB8AC3E}">
-        <p14:creationId xmlns:p14="http://schemas.microsoft.com/office/powerpoint/2010/main" val="4033793850"/>
+        <p14:creationId xmlns:p14="http://schemas.microsoft.com/office/powerpoint/2010/main" xmlns="" val="4033793850"/>
       </p:ext>
     </p:extLst>
   </p:cSld>
@@ -3197,9 +3233,488 @@
     </p:spTree>
     <p:extLst>
       <p:ext uri="{BB962C8B-B14F-4D97-AF65-F5344CB8AC3E}">
-        <p14:creationId xmlns:p14="http://schemas.microsoft.com/office/powerpoint/2010/main" val="3254071163"/>
+        <p14:creationId xmlns:p14="http://schemas.microsoft.com/office/powerpoint/2010/main" xmlns="" val="3254071163"/>
       </p:ext>
     </p:extLst>
+  </p:cSld>
+  <p:clrMapOvr>
+    <a:masterClrMapping/>
+  </p:clrMapOvr>
+  <p:timing>
+    <p:tnLst>
+      <p:par>
+        <p:cTn id="1" dur="indefinite" restart="never" nodeType="tmRoot"/>
+      </p:par>
+    </p:tnLst>
+  </p:timing>
+</p:sld>
+</file>
+
+<file path=ppt/slides/slide10.xml><?xml version="1.0" encoding="utf-8"?>
+<p:sld xmlns:a="http://schemas.openxmlformats.org/drawingml/2006/main" xmlns:r="http://schemas.openxmlformats.org/officeDocument/2006/relationships" xmlns:p="http://schemas.openxmlformats.org/presentationml/2006/main">
+  <p:cSld>
+    <p:spTree>
+      <p:nvGrpSpPr>
+        <p:cNvPr id="1" name=""/>
+        <p:cNvGrpSpPr/>
+        <p:nvPr/>
+      </p:nvGrpSpPr>
+      <p:grpSpPr>
+        <a:xfrm>
+          <a:off x="0" y="0"/>
+          <a:ext cx="0" cy="0"/>
+          <a:chOff x="0" y="0"/>
+          <a:chExt cx="0" cy="0"/>
+        </a:xfrm>
+      </p:grpSpPr>
+      <p:sp>
+        <p:nvSpPr>
+          <p:cNvPr id="2" name="Title 1"/>
+          <p:cNvSpPr>
+            <a:spLocks noGrp="1"/>
+          </p:cNvSpPr>
+          <p:nvPr>
+            <p:ph type="title"/>
+          </p:nvPr>
+        </p:nvSpPr>
+        <p:spPr/>
+        <p:txBody>
+          <a:bodyPr/>
+          <a:lstStyle/>
+          <a:p>
+            <a:r>
+              <a:rPr lang="en-US" dirty="0" err="1" smtClean="0"/>
+              <a:t>ServerThread</a:t>
+            </a:r>
+            <a:r>
+              <a:rPr lang="en-US" dirty="0" smtClean="0"/>
+              <a:t> State Diagram</a:t>
+            </a:r>
+            <a:endParaRPr lang="en-US" dirty="0"/>
+          </a:p>
+        </p:txBody>
+      </p:sp>
+      <p:pic>
+        <p:nvPicPr>
+          <p:cNvPr id="4" name="Content Placeholder 3" descr="ServerThread State.png"/>
+          <p:cNvPicPr>
+            <a:picLocks noGrp="1" noChangeAspect="1"/>
+          </p:cNvPicPr>
+          <p:nvPr>
+            <p:ph idx="1"/>
+          </p:nvPr>
+        </p:nvPicPr>
+        <p:blipFill>
+          <a:blip r:embed="rId2" cstate="print"/>
+          <a:stretch>
+            <a:fillRect/>
+          </a:stretch>
+        </p:blipFill>
+        <p:spPr>
+          <a:xfrm>
+            <a:off x="62687" y="1676400"/>
+            <a:ext cx="9018626" cy="5029200"/>
+          </a:xfrm>
+        </p:spPr>
+      </p:pic>
+    </p:spTree>
+  </p:cSld>
+  <p:clrMapOvr>
+    <a:masterClrMapping/>
+  </p:clrMapOvr>
+  <p:timing>
+    <p:tnLst>
+      <p:par>
+        <p:cTn id="1" dur="indefinite" restart="never" nodeType="tmRoot"/>
+      </p:par>
+    </p:tnLst>
+  </p:timing>
+</p:sld>
+</file>
+
+<file path=ppt/slides/slide11.xml><?xml version="1.0" encoding="utf-8"?>
+<p:sld xmlns:a="http://schemas.openxmlformats.org/drawingml/2006/main" xmlns:r="http://schemas.openxmlformats.org/officeDocument/2006/relationships" xmlns:p="http://schemas.openxmlformats.org/presentationml/2006/main">
+  <p:cSld>
+    <p:spTree>
+      <p:nvGrpSpPr>
+        <p:cNvPr id="1" name=""/>
+        <p:cNvGrpSpPr/>
+        <p:nvPr/>
+      </p:nvGrpSpPr>
+      <p:grpSpPr>
+        <a:xfrm>
+          <a:off x="0" y="0"/>
+          <a:ext cx="0" cy="0"/>
+          <a:chOff x="0" y="0"/>
+          <a:chExt cx="0" cy="0"/>
+        </a:xfrm>
+      </p:grpSpPr>
+      <p:sp>
+        <p:nvSpPr>
+          <p:cNvPr id="2" name="Title 1"/>
+          <p:cNvSpPr>
+            <a:spLocks noGrp="1"/>
+          </p:cNvSpPr>
+          <p:nvPr>
+            <p:ph type="title"/>
+          </p:nvPr>
+        </p:nvSpPr>
+        <p:spPr/>
+        <p:txBody>
+          <a:bodyPr/>
+          <a:lstStyle/>
+          <a:p>
+            <a:r>
+              <a:rPr lang="en-US" dirty="0" smtClean="0"/>
+              <a:t>Initial GUI</a:t>
+            </a:r>
+            <a:endParaRPr lang="en-US" dirty="0"/>
+          </a:p>
+        </p:txBody>
+      </p:sp>
+      <p:pic>
+        <p:nvPicPr>
+          <p:cNvPr id="3" name="Picture 2" descr="Welcome Screen.jpg"/>
+          <p:cNvPicPr>
+            <a:picLocks noGrp="1" noChangeAspect="1"/>
+          </p:cNvPicPr>
+          <p:nvPr isPhoto="1"/>
+        </p:nvPicPr>
+        <p:blipFill>
+          <a:blip r:embed="rId2" cstate="print">
+            <a:lum/>
+          </a:blip>
+          <a:stretch>
+            <a:fillRect/>
+          </a:stretch>
+        </p:blipFill>
+        <p:spPr>
+          <a:xfrm>
+            <a:off x="813114" y="1219200"/>
+            <a:ext cx="7517773" cy="5638800"/>
+          </a:xfrm>
+          <a:prstGeom prst="rect">
+            <a:avLst/>
+          </a:prstGeom>
+          <a:noFill/>
+          <a:ln>
+            <a:noFill/>
+          </a:ln>
+        </p:spPr>
+      </p:pic>
+    </p:spTree>
+  </p:cSld>
+  <p:clrMapOvr>
+    <a:masterClrMapping/>
+  </p:clrMapOvr>
+</p:sld>
+</file>
+
+<file path=ppt/slides/slide12.xml><?xml version="1.0" encoding="utf-8"?>
+<p:sld xmlns:a="http://schemas.openxmlformats.org/drawingml/2006/main" xmlns:r="http://schemas.openxmlformats.org/officeDocument/2006/relationships" xmlns:p="http://schemas.openxmlformats.org/presentationml/2006/main">
+  <p:cSld>
+    <p:spTree>
+      <p:nvGrpSpPr>
+        <p:cNvPr id="1" name=""/>
+        <p:cNvGrpSpPr/>
+        <p:nvPr/>
+      </p:nvGrpSpPr>
+      <p:grpSpPr>
+        <a:xfrm>
+          <a:off x="0" y="0"/>
+          <a:ext cx="0" cy="0"/>
+          <a:chOff x="0" y="0"/>
+          <a:chExt cx="0" cy="0"/>
+        </a:xfrm>
+      </p:grpSpPr>
+      <p:sp>
+        <p:nvSpPr>
+          <p:cNvPr id="2" name="Title 1"/>
+          <p:cNvSpPr>
+            <a:spLocks noGrp="1"/>
+          </p:cNvSpPr>
+          <p:nvPr>
+            <p:ph type="title"/>
+          </p:nvPr>
+        </p:nvSpPr>
+        <p:spPr/>
+        <p:txBody>
+          <a:bodyPr/>
+          <a:lstStyle/>
+          <a:p>
+            <a:r>
+              <a:rPr lang="en-US" dirty="0" smtClean="0"/>
+              <a:t>Main Student GUI</a:t>
+            </a:r>
+            <a:endParaRPr lang="en-US" dirty="0"/>
+          </a:p>
+        </p:txBody>
+      </p:sp>
+      <p:pic>
+        <p:nvPicPr>
+          <p:cNvPr id="3" name="Picture 2" descr="Student.jpg"/>
+          <p:cNvPicPr>
+            <a:picLocks noGrp="1" noChangeAspect="1"/>
+          </p:cNvPicPr>
+          <p:nvPr isPhoto="1"/>
+        </p:nvPicPr>
+        <p:blipFill>
+          <a:blip r:embed="rId2" cstate="print">
+            <a:lum/>
+          </a:blip>
+          <a:stretch>
+            <a:fillRect/>
+          </a:stretch>
+        </p:blipFill>
+        <p:spPr>
+          <a:xfrm>
+            <a:off x="762318" y="1143000"/>
+            <a:ext cx="7619364" cy="5715000"/>
+          </a:xfrm>
+          <a:prstGeom prst="rect">
+            <a:avLst/>
+          </a:prstGeom>
+          <a:noFill/>
+          <a:ln>
+            <a:noFill/>
+          </a:ln>
+        </p:spPr>
+      </p:pic>
+    </p:spTree>
+  </p:cSld>
+  <p:clrMapOvr>
+    <a:masterClrMapping/>
+  </p:clrMapOvr>
+</p:sld>
+</file>
+
+<file path=ppt/slides/slide13.xml><?xml version="1.0" encoding="utf-8"?>
+<p:sld xmlns:a="http://schemas.openxmlformats.org/drawingml/2006/main" xmlns:r="http://schemas.openxmlformats.org/officeDocument/2006/relationships" xmlns:p="http://schemas.openxmlformats.org/presentationml/2006/main">
+  <p:cSld>
+    <p:spTree>
+      <p:nvGrpSpPr>
+        <p:cNvPr id="1" name=""/>
+        <p:cNvGrpSpPr/>
+        <p:nvPr/>
+      </p:nvGrpSpPr>
+      <p:grpSpPr>
+        <a:xfrm>
+          <a:off x="0" y="0"/>
+          <a:ext cx="0" cy="0"/>
+          <a:chOff x="0" y="0"/>
+          <a:chExt cx="0" cy="0"/>
+        </a:xfrm>
+      </p:grpSpPr>
+      <p:sp>
+        <p:nvSpPr>
+          <p:cNvPr id="2" name="Title 1"/>
+          <p:cNvSpPr>
+            <a:spLocks noGrp="1"/>
+          </p:cNvSpPr>
+          <p:nvPr>
+            <p:ph type="title"/>
+          </p:nvPr>
+        </p:nvSpPr>
+        <p:spPr/>
+        <p:txBody>
+          <a:bodyPr/>
+          <a:lstStyle/>
+          <a:p>
+            <a:r>
+              <a:rPr lang="en-US" dirty="0" smtClean="0"/>
+              <a:t>Login GUI</a:t>
+            </a:r>
+            <a:endParaRPr lang="en-US" dirty="0"/>
+          </a:p>
+        </p:txBody>
+      </p:sp>
+      <p:pic>
+        <p:nvPicPr>
+          <p:cNvPr id="3" name="Picture 2" descr="LogInPage.jpg"/>
+          <p:cNvPicPr>
+            <a:picLocks noGrp="1" noChangeAspect="1"/>
+          </p:cNvPicPr>
+          <p:nvPr isPhoto="1"/>
+        </p:nvPicPr>
+        <p:blipFill>
+          <a:blip r:embed="rId2" cstate="print">
+            <a:lum/>
+          </a:blip>
+          <a:stretch>
+            <a:fillRect/>
+          </a:stretch>
+        </p:blipFill>
+        <p:spPr>
+          <a:xfrm>
+            <a:off x="869156" y="1303270"/>
+            <a:ext cx="7405688" cy="5554730"/>
+          </a:xfrm>
+          <a:prstGeom prst="rect">
+            <a:avLst/>
+          </a:prstGeom>
+          <a:noFill/>
+          <a:ln>
+            <a:noFill/>
+          </a:ln>
+        </p:spPr>
+      </p:pic>
+    </p:spTree>
+  </p:cSld>
+  <p:clrMapOvr>
+    <a:masterClrMapping/>
+  </p:clrMapOvr>
+</p:sld>
+</file>
+
+<file path=ppt/slides/slide14.xml><?xml version="1.0" encoding="utf-8"?>
+<p:sld xmlns:a="http://schemas.openxmlformats.org/drawingml/2006/main" xmlns:r="http://schemas.openxmlformats.org/officeDocument/2006/relationships" xmlns:p="http://schemas.openxmlformats.org/presentationml/2006/main">
+  <p:cSld>
+    <p:spTree>
+      <p:nvGrpSpPr>
+        <p:cNvPr id="1" name=""/>
+        <p:cNvGrpSpPr/>
+        <p:nvPr/>
+      </p:nvGrpSpPr>
+      <p:grpSpPr>
+        <a:xfrm>
+          <a:off x="0" y="0"/>
+          <a:ext cx="0" cy="0"/>
+          <a:chOff x="0" y="0"/>
+          <a:chExt cx="0" cy="0"/>
+        </a:xfrm>
+      </p:grpSpPr>
+      <p:sp>
+        <p:nvSpPr>
+          <p:cNvPr id="2" name="Title 1"/>
+          <p:cNvSpPr>
+            <a:spLocks noGrp="1"/>
+          </p:cNvSpPr>
+          <p:nvPr>
+            <p:ph type="title"/>
+          </p:nvPr>
+        </p:nvSpPr>
+        <p:spPr/>
+        <p:txBody>
+          <a:bodyPr/>
+          <a:lstStyle/>
+          <a:p>
+            <a:r>
+              <a:rPr lang="en-US" dirty="0" smtClean="0"/>
+              <a:t>Department Administrator GUI</a:t>
+            </a:r>
+            <a:endParaRPr lang="en-US" dirty="0"/>
+          </a:p>
+        </p:txBody>
+      </p:sp>
+      <p:pic>
+        <p:nvPicPr>
+          <p:cNvPr id="3" name="Picture 2" descr="Admin Page.jpg"/>
+          <p:cNvPicPr>
+            <a:picLocks noGrp="1" noChangeAspect="1"/>
+          </p:cNvPicPr>
+          <p:nvPr isPhoto="1"/>
+        </p:nvPicPr>
+        <p:blipFill>
+          <a:blip r:embed="rId2" cstate="print">
+            <a:lum/>
+          </a:blip>
+          <a:stretch>
+            <a:fillRect/>
+          </a:stretch>
+        </p:blipFill>
+        <p:spPr>
+          <a:xfrm>
+            <a:off x="762318" y="1143000"/>
+            <a:ext cx="7619365" cy="5715000"/>
+          </a:xfrm>
+          <a:prstGeom prst="rect">
+            <a:avLst/>
+          </a:prstGeom>
+          <a:noFill/>
+          <a:ln>
+            <a:noFill/>
+          </a:ln>
+        </p:spPr>
+      </p:pic>
+    </p:spTree>
+  </p:cSld>
+  <p:clrMapOvr>
+    <a:masterClrMapping/>
+  </p:clrMapOvr>
+</p:sld>
+</file>
+
+<file path=ppt/slides/slide15.xml><?xml version="1.0" encoding="utf-8"?>
+<p:sld xmlns:a="http://schemas.openxmlformats.org/drawingml/2006/main" xmlns:r="http://schemas.openxmlformats.org/officeDocument/2006/relationships" xmlns:p="http://schemas.openxmlformats.org/presentationml/2006/main">
+  <p:cSld>
+    <p:spTree>
+      <p:nvGrpSpPr>
+        <p:cNvPr id="1" name=""/>
+        <p:cNvGrpSpPr/>
+        <p:nvPr/>
+      </p:nvGrpSpPr>
+      <p:grpSpPr>
+        <a:xfrm>
+          <a:off x="0" y="0"/>
+          <a:ext cx="0" cy="0"/>
+          <a:chOff x="0" y="0"/>
+          <a:chExt cx="0" cy="0"/>
+        </a:xfrm>
+      </p:grpSpPr>
+      <p:sp>
+        <p:nvSpPr>
+          <p:cNvPr id="2" name="Title 1"/>
+          <p:cNvSpPr>
+            <a:spLocks noGrp="1"/>
+          </p:cNvSpPr>
+          <p:nvPr>
+            <p:ph type="title"/>
+          </p:nvPr>
+        </p:nvSpPr>
+        <p:spPr/>
+        <p:txBody>
+          <a:bodyPr/>
+          <a:lstStyle/>
+          <a:p>
+            <a:r>
+              <a:rPr lang="en-US" dirty="0" smtClean="0"/>
+              <a:t>Registrar Administrator GUI</a:t>
+            </a:r>
+            <a:endParaRPr lang="en-US" dirty="0"/>
+          </a:p>
+        </p:txBody>
+      </p:sp>
+      <p:pic>
+        <p:nvPicPr>
+          <p:cNvPr id="3" name="Picture 2" descr="Register Admin Page.jpg"/>
+          <p:cNvPicPr>
+            <a:picLocks noGrp="1" noChangeAspect="1"/>
+          </p:cNvPicPr>
+          <p:nvPr isPhoto="1"/>
+        </p:nvPicPr>
+        <p:blipFill>
+          <a:blip r:embed="rId2" cstate="print">
+            <a:lum/>
+          </a:blip>
+          <a:stretch>
+            <a:fillRect/>
+          </a:stretch>
+        </p:blipFill>
+        <p:spPr>
+          <a:xfrm>
+            <a:off x="762318" y="1143000"/>
+            <a:ext cx="7619364" cy="5715000"/>
+          </a:xfrm>
+          <a:prstGeom prst="rect">
+            <a:avLst/>
+          </a:prstGeom>
+          <a:noFill/>
+          <a:ln>
+            <a:noFill/>
+          </a:ln>
+        </p:spPr>
+      </p:pic>
+    </p:spTree>
   </p:cSld>
   <p:clrMapOvr>
     <a:masterClrMapping/>
@@ -3241,51 +3756,97 @@
           <a:p>
             <a:r>
               <a:rPr lang="en-US" dirty="0" smtClean="0"/>
-              <a:t>Components</a:t>
+              <a:t>Design Choices</a:t>
             </a:r>
             <a:endParaRPr lang="en-US" dirty="0"/>
           </a:p>
         </p:txBody>
       </p:sp>
-      <p:pic>
-        <p:nvPicPr>
-          <p:cNvPr id="4" name="Content Placeholder 3"/>
-          <p:cNvPicPr>
-            <a:picLocks noGrp="1" noChangeAspect="1"/>
-          </p:cNvPicPr>
+      <p:sp>
+        <p:nvSpPr>
+          <p:cNvPr id="3" name="Content Placeholder 2"/>
+          <p:cNvSpPr>
+            <a:spLocks noGrp="1"/>
+          </p:cNvSpPr>
           <p:nvPr>
             <p:ph idx="1"/>
           </p:nvPr>
-        </p:nvPicPr>
-        <p:blipFill>
-          <a:blip r:embed="rId2">
-            <a:extLst>
-              <a:ext uri="{28A0092B-C50C-407E-A947-70E740481C1C}">
-                <a14:useLocalDpi xmlns:a14="http://schemas.microsoft.com/office/drawing/2010/main" val="0"/>
-              </a:ext>
-            </a:extLst>
-          </a:blip>
-          <a:stretch>
-            <a:fillRect/>
-          </a:stretch>
-        </p:blipFill>
-        <p:spPr>
-          <a:xfrm>
-            <a:off x="1586320" y="1219200"/>
-            <a:ext cx="5971361" cy="5315168"/>
-          </a:xfrm>
-        </p:spPr>
-      </p:pic>
+        </p:nvSpPr>
+        <p:spPr/>
+        <p:txBody>
+          <a:bodyPr/>
+          <a:lstStyle/>
+          <a:p>
+            <a:r>
+              <a:rPr lang="en-US" dirty="0" smtClean="0">
+                <a:solidFill>
+                  <a:srgbClr val="000000"/>
+                </a:solidFill>
+              </a:rPr>
+              <a:t>Client-Server applications</a:t>
+            </a:r>
+          </a:p>
+          <a:p>
+            <a:pPr lvl="1"/>
+            <a:r>
+              <a:rPr lang="en-US" dirty="0" smtClean="0">
+                <a:solidFill>
+                  <a:srgbClr val="000000"/>
+                </a:solidFill>
+              </a:rPr>
+              <a:t>All members much more familiar with swing than with web applications</a:t>
+            </a:r>
+          </a:p>
+          <a:p>
+            <a:pPr lvl="1"/>
+            <a:r>
+              <a:rPr lang="en-US" dirty="0" smtClean="0">
+                <a:solidFill>
+                  <a:srgbClr val="000000"/>
+                </a:solidFill>
+              </a:rPr>
+              <a:t>Seemed to be easier to code</a:t>
+            </a:r>
+          </a:p>
+          <a:p>
+            <a:r>
+              <a:rPr lang="en-US" dirty="0" smtClean="0">
+                <a:solidFill>
+                  <a:srgbClr val="000000"/>
+                </a:solidFill>
+              </a:rPr>
+              <a:t>Sockets for communication</a:t>
+            </a:r>
+          </a:p>
+          <a:p>
+            <a:r>
+              <a:rPr lang="en-US" dirty="0" smtClean="0">
+                <a:solidFill>
+                  <a:srgbClr val="000000"/>
+                </a:solidFill>
+              </a:rPr>
+              <a:t>Swing for GUI</a:t>
+            </a:r>
+            <a:endParaRPr lang="en-US" dirty="0">
+              <a:solidFill>
+                <a:srgbClr val="000000"/>
+              </a:solidFill>
+            </a:endParaRPr>
+          </a:p>
+        </p:txBody>
+      </p:sp>
     </p:spTree>
-    <p:extLst>
-      <p:ext uri="{BB962C8B-B14F-4D97-AF65-F5344CB8AC3E}">
-        <p14:creationId xmlns:p14="http://schemas.microsoft.com/office/powerpoint/2010/main" val="2126796741"/>
-      </p:ext>
-    </p:extLst>
   </p:cSld>
   <p:clrMapOvr>
     <a:masterClrMapping/>
   </p:clrMapOvr>
+  <p:timing>
+    <p:tnLst>
+      <p:par>
+        <p:cTn id="1" dur="indefinite" restart="never" nodeType="tmRoot"/>
+      </p:par>
+    </p:tnLst>
+  </p:timing>
 </p:sld>
 </file>
 
@@ -3322,10 +3883,10 @@
           <a:lstStyle/>
           <a:p>
             <a:r>
-              <a:rPr lang="en-US" smtClean="0"/>
-              <a:t>Class Diagram</a:t>
-            </a:r>
-            <a:endParaRPr lang="en-US"/>
+              <a:rPr lang="en-US" dirty="0" smtClean="0"/>
+              <a:t>More Design Choices</a:t>
+            </a:r>
+            <a:endParaRPr lang="en-US" dirty="0"/>
           </a:p>
         </p:txBody>
       </p:sp>
@@ -3344,16 +3905,508 @@
           <a:bodyPr/>
           <a:lstStyle/>
           <a:p>
-            <a:endParaRPr lang="en-US"/>
-          </a:p>
-        </p:txBody>
-      </p:sp>
+            <a:r>
+              <a:rPr lang="en-US" dirty="0" smtClean="0"/>
+              <a:t>Java will be used for development with </a:t>
+            </a:r>
+            <a:r>
+              <a:rPr lang="en-US" dirty="0" err="1" smtClean="0"/>
+              <a:t>Netbeans</a:t>
+            </a:r>
+            <a:r>
+              <a:rPr lang="en-US" dirty="0" smtClean="0"/>
+              <a:t> </a:t>
+            </a:r>
+            <a:r>
+              <a:rPr lang="en-US" dirty="0" smtClean="0"/>
+              <a:t>or Eclipse as the IDE</a:t>
+            </a:r>
+          </a:p>
+          <a:p>
+            <a:r>
+              <a:rPr lang="en-US" dirty="0" smtClean="0"/>
+              <a:t>JPA and JDBC for Administrator login IDs, passwords, as well as courses and requirements</a:t>
+            </a:r>
+          </a:p>
+          <a:p>
+            <a:endParaRPr lang="en-US" dirty="0" smtClean="0"/>
+          </a:p>
+          <a:p>
+            <a:endParaRPr lang="en-US" dirty="0" smtClean="0"/>
+          </a:p>
+        </p:txBody>
+      </p:sp>
+    </p:spTree>
+  </p:cSld>
+  <p:clrMapOvr>
+    <a:masterClrMapping/>
+  </p:clrMapOvr>
+  <p:timing>
+    <p:tnLst>
+      <p:par>
+        <p:cTn id="1" dur="indefinite" restart="never" nodeType="tmRoot"/>
+      </p:par>
+    </p:tnLst>
+  </p:timing>
+</p:sld>
+</file>
+
+<file path=ppt/slides/slide4.xml><?xml version="1.0" encoding="utf-8"?>
+<p:sld xmlns:a="http://schemas.openxmlformats.org/drawingml/2006/main" xmlns:r="http://schemas.openxmlformats.org/officeDocument/2006/relationships" xmlns:p="http://schemas.openxmlformats.org/presentationml/2006/main">
+  <p:cSld>
+    <p:spTree>
+      <p:nvGrpSpPr>
+        <p:cNvPr id="1" name=""/>
+        <p:cNvGrpSpPr/>
+        <p:nvPr/>
+      </p:nvGrpSpPr>
+      <p:grpSpPr>
+        <a:xfrm>
+          <a:off x="0" y="0"/>
+          <a:ext cx="0" cy="0"/>
+          <a:chOff x="0" y="0"/>
+          <a:chExt cx="0" cy="0"/>
+        </a:xfrm>
+      </p:grpSpPr>
+      <p:sp>
+        <p:nvSpPr>
+          <p:cNvPr id="2" name="Title 1"/>
+          <p:cNvSpPr>
+            <a:spLocks noGrp="1"/>
+          </p:cNvSpPr>
+          <p:nvPr>
+            <p:ph type="title"/>
+          </p:nvPr>
+        </p:nvSpPr>
+        <p:spPr/>
+        <p:txBody>
+          <a:bodyPr/>
+          <a:lstStyle/>
+          <a:p>
+            <a:r>
+              <a:rPr lang="en-US" dirty="0" smtClean="0"/>
+              <a:t>Components</a:t>
+            </a:r>
+            <a:endParaRPr lang="en-US" dirty="0"/>
+          </a:p>
+        </p:txBody>
+      </p:sp>
+      <p:pic>
+        <p:nvPicPr>
+          <p:cNvPr id="4" name="Content Placeholder 3"/>
+          <p:cNvPicPr>
+            <a:picLocks noGrp="1" noChangeAspect="1"/>
+          </p:cNvPicPr>
+          <p:nvPr>
+            <p:ph idx="1"/>
+          </p:nvPr>
+        </p:nvPicPr>
+        <p:blipFill>
+          <a:blip r:embed="rId2" cstate="print">
+            <a:extLst>
+              <a:ext uri="{28A0092B-C50C-407E-A947-70E740481C1C}">
+                <a14:useLocalDpi xmlns:a14="http://schemas.microsoft.com/office/drawing/2010/main" xmlns="" val="0"/>
+              </a:ext>
+            </a:extLst>
+          </a:blip>
+          <a:stretch>
+            <a:fillRect/>
+          </a:stretch>
+        </p:blipFill>
+        <p:spPr>
+          <a:xfrm>
+            <a:off x="1586320" y="1219200"/>
+            <a:ext cx="5971361" cy="5315168"/>
+          </a:xfrm>
+        </p:spPr>
+      </p:pic>
     </p:spTree>
     <p:extLst>
       <p:ext uri="{BB962C8B-B14F-4D97-AF65-F5344CB8AC3E}">
-        <p14:creationId xmlns:p14="http://schemas.microsoft.com/office/powerpoint/2010/main" val="416510314"/>
+        <p14:creationId xmlns:p14="http://schemas.microsoft.com/office/powerpoint/2010/main" xmlns="" val="2126796741"/>
       </p:ext>
     </p:extLst>
+  </p:cSld>
+  <p:clrMapOvr>
+    <a:masterClrMapping/>
+  </p:clrMapOvr>
+  <p:timing>
+    <p:tnLst>
+      <p:par>
+        <p:cTn id="1" dur="indefinite" restart="never" nodeType="tmRoot"/>
+      </p:par>
+    </p:tnLst>
+  </p:timing>
+</p:sld>
+</file>
+
+<file path=ppt/slides/slide5.xml><?xml version="1.0" encoding="utf-8"?>
+<p:sld xmlns:a="http://schemas.openxmlformats.org/drawingml/2006/main" xmlns:r="http://schemas.openxmlformats.org/officeDocument/2006/relationships" xmlns:p="http://schemas.openxmlformats.org/presentationml/2006/main">
+  <p:cSld>
+    <p:spTree>
+      <p:nvGrpSpPr>
+        <p:cNvPr id="1" name=""/>
+        <p:cNvGrpSpPr/>
+        <p:nvPr/>
+      </p:nvGrpSpPr>
+      <p:grpSpPr>
+        <a:xfrm>
+          <a:off x="0" y="0"/>
+          <a:ext cx="0" cy="0"/>
+          <a:chOff x="0" y="0"/>
+          <a:chExt cx="0" cy="0"/>
+        </a:xfrm>
+      </p:grpSpPr>
+      <p:sp>
+        <p:nvSpPr>
+          <p:cNvPr id="2" name="Title 1"/>
+          <p:cNvSpPr>
+            <a:spLocks noGrp="1"/>
+          </p:cNvSpPr>
+          <p:nvPr>
+            <p:ph type="title"/>
+          </p:nvPr>
+        </p:nvSpPr>
+        <p:spPr/>
+        <p:txBody>
+          <a:bodyPr/>
+          <a:lstStyle/>
+          <a:p>
+            <a:r>
+              <a:rPr lang="en-US" dirty="0" smtClean="0"/>
+              <a:t>Server Class Diagram</a:t>
+            </a:r>
+            <a:endParaRPr lang="en-US" dirty="0"/>
+          </a:p>
+        </p:txBody>
+      </p:sp>
+      <p:pic>
+        <p:nvPicPr>
+          <p:cNvPr id="4" name="Content Placeholder 3" descr="server.jpg"/>
+          <p:cNvPicPr>
+            <a:picLocks noGrp="1" noChangeAspect="1"/>
+          </p:cNvPicPr>
+          <p:nvPr>
+            <p:ph idx="1"/>
+          </p:nvPr>
+        </p:nvPicPr>
+        <p:blipFill>
+          <a:blip r:embed="rId2" cstate="print"/>
+          <a:stretch>
+            <a:fillRect/>
+          </a:stretch>
+        </p:blipFill>
+        <p:spPr>
+          <a:xfrm>
+            <a:off x="838200" y="1149385"/>
+            <a:ext cx="7574742" cy="5708615"/>
+          </a:xfrm>
+        </p:spPr>
+      </p:pic>
+    </p:spTree>
+    <p:extLst>
+      <p:ext uri="{BB962C8B-B14F-4D97-AF65-F5344CB8AC3E}">
+        <p14:creationId xmlns:p14="http://schemas.microsoft.com/office/powerpoint/2010/main" xmlns="" val="416510314"/>
+      </p:ext>
+    </p:extLst>
+  </p:cSld>
+  <p:clrMapOvr>
+    <a:masterClrMapping/>
+  </p:clrMapOvr>
+  <p:timing>
+    <p:tnLst>
+      <p:par>
+        <p:cTn id="1" dur="indefinite" restart="never" nodeType="tmRoot"/>
+      </p:par>
+    </p:tnLst>
+  </p:timing>
+</p:sld>
+</file>
+
+<file path=ppt/slides/slide6.xml><?xml version="1.0" encoding="utf-8"?>
+<p:sld xmlns:a="http://schemas.openxmlformats.org/drawingml/2006/main" xmlns:r="http://schemas.openxmlformats.org/officeDocument/2006/relationships" xmlns:p="http://schemas.openxmlformats.org/presentationml/2006/main">
+  <p:cSld>
+    <p:spTree>
+      <p:nvGrpSpPr>
+        <p:cNvPr id="1" name=""/>
+        <p:cNvGrpSpPr/>
+        <p:nvPr/>
+      </p:nvGrpSpPr>
+      <p:grpSpPr>
+        <a:xfrm>
+          <a:off x="0" y="0"/>
+          <a:ext cx="0" cy="0"/>
+          <a:chOff x="0" y="0"/>
+          <a:chExt cx="0" cy="0"/>
+        </a:xfrm>
+      </p:grpSpPr>
+      <p:sp>
+        <p:nvSpPr>
+          <p:cNvPr id="2" name="Title 1"/>
+          <p:cNvSpPr>
+            <a:spLocks noGrp="1"/>
+          </p:cNvSpPr>
+          <p:nvPr>
+            <p:ph type="title"/>
+          </p:nvPr>
+        </p:nvSpPr>
+        <p:spPr/>
+        <p:txBody>
+          <a:bodyPr/>
+          <a:lstStyle/>
+          <a:p>
+            <a:r>
+              <a:rPr lang="en-US" dirty="0" smtClean="0"/>
+              <a:t>Client Class Diagram</a:t>
+            </a:r>
+            <a:endParaRPr lang="en-US" dirty="0"/>
+          </a:p>
+        </p:txBody>
+      </p:sp>
+      <p:pic>
+        <p:nvPicPr>
+          <p:cNvPr id="4" name="Content Placeholder 3" descr="client.jpg"/>
+          <p:cNvPicPr>
+            <a:picLocks noGrp="1" noChangeAspect="1"/>
+          </p:cNvPicPr>
+          <p:nvPr>
+            <p:ph idx="1"/>
+          </p:nvPr>
+        </p:nvPicPr>
+        <p:blipFill>
+          <a:blip r:embed="rId2" cstate="print"/>
+          <a:stretch>
+            <a:fillRect/>
+          </a:stretch>
+        </p:blipFill>
+        <p:spPr>
+          <a:xfrm>
+            <a:off x="152400" y="1265237"/>
+            <a:ext cx="8766542" cy="5592763"/>
+          </a:xfrm>
+        </p:spPr>
+      </p:pic>
+    </p:spTree>
+  </p:cSld>
+  <p:clrMapOvr>
+    <a:masterClrMapping/>
+  </p:clrMapOvr>
+  <p:timing>
+    <p:tnLst>
+      <p:par>
+        <p:cTn id="1" dur="indefinite" restart="never" nodeType="tmRoot"/>
+      </p:par>
+    </p:tnLst>
+  </p:timing>
+</p:sld>
+</file>
+
+<file path=ppt/slides/slide7.xml><?xml version="1.0" encoding="utf-8"?>
+<p:sld xmlns:a="http://schemas.openxmlformats.org/drawingml/2006/main" xmlns:r="http://schemas.openxmlformats.org/officeDocument/2006/relationships" xmlns:p="http://schemas.openxmlformats.org/presentationml/2006/main">
+  <p:cSld>
+    <p:spTree>
+      <p:nvGrpSpPr>
+        <p:cNvPr id="1" name=""/>
+        <p:cNvGrpSpPr/>
+        <p:nvPr/>
+      </p:nvGrpSpPr>
+      <p:grpSpPr>
+        <a:xfrm>
+          <a:off x="0" y="0"/>
+          <a:ext cx="0" cy="0"/>
+          <a:chOff x="0" y="0"/>
+          <a:chExt cx="0" cy="0"/>
+        </a:xfrm>
+      </p:grpSpPr>
+      <p:sp>
+        <p:nvSpPr>
+          <p:cNvPr id="2" name="Title 1"/>
+          <p:cNvSpPr>
+            <a:spLocks noGrp="1"/>
+          </p:cNvSpPr>
+          <p:nvPr>
+            <p:ph type="title"/>
+          </p:nvPr>
+        </p:nvSpPr>
+        <p:spPr/>
+        <p:txBody>
+          <a:bodyPr/>
+          <a:lstStyle/>
+          <a:p>
+            <a:r>
+              <a:rPr lang="en-US" dirty="0" smtClean="0"/>
+              <a:t>Student Activity Diagram</a:t>
+            </a:r>
+            <a:endParaRPr lang="en-US" dirty="0"/>
+          </a:p>
+        </p:txBody>
+      </p:sp>
+      <p:pic>
+        <p:nvPicPr>
+          <p:cNvPr id="4" name="Content Placeholder 3" descr="student.png"/>
+          <p:cNvPicPr>
+            <a:picLocks noGrp="1" noChangeAspect="1"/>
+          </p:cNvPicPr>
+          <p:nvPr>
+            <p:ph idx="1"/>
+          </p:nvPr>
+        </p:nvPicPr>
+        <p:blipFill>
+          <a:blip r:embed="rId2" cstate="print"/>
+          <a:stretch>
+            <a:fillRect/>
+          </a:stretch>
+        </p:blipFill>
+        <p:spPr>
+          <a:xfrm>
+            <a:off x="88281" y="1143001"/>
+            <a:ext cx="8967439" cy="5715000"/>
+          </a:xfrm>
+        </p:spPr>
+      </p:pic>
+    </p:spTree>
+  </p:cSld>
+  <p:clrMapOvr>
+    <a:masterClrMapping/>
+  </p:clrMapOvr>
+</p:sld>
+</file>
+
+<file path=ppt/slides/slide8.xml><?xml version="1.0" encoding="utf-8"?>
+<p:sld xmlns:a="http://schemas.openxmlformats.org/drawingml/2006/main" xmlns:r="http://schemas.openxmlformats.org/officeDocument/2006/relationships" xmlns:p="http://schemas.openxmlformats.org/presentationml/2006/main">
+  <p:cSld>
+    <p:spTree>
+      <p:nvGrpSpPr>
+        <p:cNvPr id="1" name=""/>
+        <p:cNvGrpSpPr/>
+        <p:nvPr/>
+      </p:nvGrpSpPr>
+      <p:grpSpPr>
+        <a:xfrm>
+          <a:off x="0" y="0"/>
+          <a:ext cx="0" cy="0"/>
+          <a:chOff x="0" y="0"/>
+          <a:chExt cx="0" cy="0"/>
+        </a:xfrm>
+      </p:grpSpPr>
+      <p:sp>
+        <p:nvSpPr>
+          <p:cNvPr id="2" name="Title 1"/>
+          <p:cNvSpPr>
+            <a:spLocks noGrp="1"/>
+          </p:cNvSpPr>
+          <p:nvPr>
+            <p:ph type="title"/>
+          </p:nvPr>
+        </p:nvSpPr>
+        <p:spPr/>
+        <p:txBody>
+          <a:bodyPr/>
+          <a:lstStyle/>
+          <a:p>
+            <a:r>
+              <a:rPr lang="en-US" dirty="0" smtClean="0"/>
+              <a:t>Registrar Admin Activity Diagram</a:t>
+            </a:r>
+            <a:endParaRPr lang="en-US" dirty="0"/>
+          </a:p>
+        </p:txBody>
+      </p:sp>
+      <p:pic>
+        <p:nvPicPr>
+          <p:cNvPr id="4" name="Content Placeholder 3" descr="super admin.png"/>
+          <p:cNvPicPr>
+            <a:picLocks noGrp="1" noChangeAspect="1"/>
+          </p:cNvPicPr>
+          <p:nvPr>
+            <p:ph idx="1"/>
+          </p:nvPr>
+        </p:nvPicPr>
+        <p:blipFill>
+          <a:blip r:embed="rId2" cstate="print"/>
+          <a:stretch>
+            <a:fillRect/>
+          </a:stretch>
+        </p:blipFill>
+        <p:spPr>
+          <a:xfrm>
+            <a:off x="867834" y="1143001"/>
+            <a:ext cx="7408333" cy="5715000"/>
+          </a:xfrm>
+        </p:spPr>
+      </p:pic>
+    </p:spTree>
+  </p:cSld>
+  <p:clrMapOvr>
+    <a:masterClrMapping/>
+  </p:clrMapOvr>
+</p:sld>
+</file>
+
+<file path=ppt/slides/slide9.xml><?xml version="1.0" encoding="utf-8"?>
+<p:sld xmlns:a="http://schemas.openxmlformats.org/drawingml/2006/main" xmlns:r="http://schemas.openxmlformats.org/officeDocument/2006/relationships" xmlns:p="http://schemas.openxmlformats.org/presentationml/2006/main">
+  <p:cSld>
+    <p:spTree>
+      <p:nvGrpSpPr>
+        <p:cNvPr id="1" name=""/>
+        <p:cNvGrpSpPr/>
+        <p:nvPr/>
+      </p:nvGrpSpPr>
+      <p:grpSpPr>
+        <a:xfrm>
+          <a:off x="0" y="0"/>
+          <a:ext cx="0" cy="0"/>
+          <a:chOff x="0" y="0"/>
+          <a:chExt cx="0" cy="0"/>
+        </a:xfrm>
+      </p:grpSpPr>
+      <p:sp>
+        <p:nvSpPr>
+          <p:cNvPr id="2" name="Title 1"/>
+          <p:cNvSpPr>
+            <a:spLocks noGrp="1"/>
+          </p:cNvSpPr>
+          <p:nvPr>
+            <p:ph type="title"/>
+          </p:nvPr>
+        </p:nvSpPr>
+        <p:spPr/>
+        <p:txBody>
+          <a:bodyPr/>
+          <a:lstStyle/>
+          <a:p>
+            <a:r>
+              <a:rPr lang="en-US" dirty="0" smtClean="0"/>
+              <a:t>Activity Sub-diagrams</a:t>
+            </a:r>
+            <a:endParaRPr lang="en-US" dirty="0"/>
+          </a:p>
+        </p:txBody>
+      </p:sp>
+      <p:pic>
+        <p:nvPicPr>
+          <p:cNvPr id="4" name="Content Placeholder 3" descr="subdiagrams.png"/>
+          <p:cNvPicPr>
+            <a:picLocks noGrp="1" noChangeAspect="1"/>
+          </p:cNvPicPr>
+          <p:nvPr>
+            <p:ph idx="1"/>
+          </p:nvPr>
+        </p:nvPicPr>
+        <p:blipFill>
+          <a:blip r:embed="rId2" cstate="print"/>
+          <a:stretch>
+            <a:fillRect/>
+          </a:stretch>
+        </p:blipFill>
+        <p:spPr>
+          <a:xfrm>
+            <a:off x="58356" y="1562100"/>
+            <a:ext cx="9027289" cy="3733800"/>
+          </a:xfrm>
+        </p:spPr>
+      </p:pic>
+    </p:spTree>
   </p:cSld>
   <p:clrMapOvr>
     <a:masterClrMapping/>

</xml_diff>

<commit_message>
Changed the PPT slightly
</commit_message>
<xml_diff>
--- a/Documents/Design review PPT.pptx
+++ b/Documents/Design review PPT.pptx
@@ -303,7 +303,7 @@
             <a:fld id="{6B65C960-0237-455E-AA9D-7CD652548A2A}" type="datetimeFigureOut">
               <a:rPr lang="en-US" smtClean="0"/>
               <a:pPr/>
-              <a:t>10/15/2010</a:t>
+              <a:t>10/17/2010</a:t>
             </a:fld>
             <a:endParaRPr lang="en-US"/>
           </a:p>
@@ -355,7 +355,7 @@
     </p:spTree>
     <p:extLst>
       <p:ext uri="{BB962C8B-B14F-4D97-AF65-F5344CB8AC3E}">
-        <p14:creationId xmlns:p14="http://schemas.microsoft.com/office/powerpoint/2010/main" xmlns="" val="1939373705"/>
+        <p14:creationId xmlns="" xmlns:p14="http://schemas.microsoft.com/office/powerpoint/2010/main" val="1939373705"/>
       </p:ext>
     </p:extLst>
   </p:cSld>
@@ -475,7 +475,7 @@
             <a:fld id="{6B65C960-0237-455E-AA9D-7CD652548A2A}" type="datetimeFigureOut">
               <a:rPr lang="en-US" smtClean="0"/>
               <a:pPr/>
-              <a:t>10/15/2010</a:t>
+              <a:t>10/17/2010</a:t>
             </a:fld>
             <a:endParaRPr lang="en-US"/>
           </a:p>
@@ -527,7 +527,7 @@
     </p:spTree>
     <p:extLst>
       <p:ext uri="{BB962C8B-B14F-4D97-AF65-F5344CB8AC3E}">
-        <p14:creationId xmlns:p14="http://schemas.microsoft.com/office/powerpoint/2010/main" xmlns="" val="3367227873"/>
+        <p14:creationId xmlns="" xmlns:p14="http://schemas.microsoft.com/office/powerpoint/2010/main" val="3367227873"/>
       </p:ext>
     </p:extLst>
   </p:cSld>
@@ -657,7 +657,7 @@
             <a:fld id="{6B65C960-0237-455E-AA9D-7CD652548A2A}" type="datetimeFigureOut">
               <a:rPr lang="en-US" smtClean="0"/>
               <a:pPr/>
-              <a:t>10/15/2010</a:t>
+              <a:t>10/17/2010</a:t>
             </a:fld>
             <a:endParaRPr lang="en-US"/>
           </a:p>
@@ -709,7 +709,7 @@
     </p:spTree>
     <p:extLst>
       <p:ext uri="{BB962C8B-B14F-4D97-AF65-F5344CB8AC3E}">
-        <p14:creationId xmlns:p14="http://schemas.microsoft.com/office/powerpoint/2010/main" xmlns="" val="1922334358"/>
+        <p14:creationId xmlns="" xmlns:p14="http://schemas.microsoft.com/office/powerpoint/2010/main" val="1922334358"/>
       </p:ext>
     </p:extLst>
   </p:cSld>
@@ -829,7 +829,7 @@
             <a:fld id="{6B65C960-0237-455E-AA9D-7CD652548A2A}" type="datetimeFigureOut">
               <a:rPr lang="en-US" smtClean="0"/>
               <a:pPr/>
-              <a:t>10/15/2010</a:t>
+              <a:t>10/17/2010</a:t>
             </a:fld>
             <a:endParaRPr lang="en-US"/>
           </a:p>
@@ -881,7 +881,7 @@
     </p:spTree>
     <p:extLst>
       <p:ext uri="{BB962C8B-B14F-4D97-AF65-F5344CB8AC3E}">
-        <p14:creationId xmlns:p14="http://schemas.microsoft.com/office/powerpoint/2010/main" xmlns="" val="3553958039"/>
+        <p14:creationId xmlns="" xmlns:p14="http://schemas.microsoft.com/office/powerpoint/2010/main" val="3553958039"/>
       </p:ext>
     </p:extLst>
   </p:cSld>
@@ -1077,7 +1077,7 @@
             <a:fld id="{6B65C960-0237-455E-AA9D-7CD652548A2A}" type="datetimeFigureOut">
               <a:rPr lang="en-US" smtClean="0"/>
               <a:pPr/>
-              <a:t>10/15/2010</a:t>
+              <a:t>10/17/2010</a:t>
             </a:fld>
             <a:endParaRPr lang="en-US"/>
           </a:p>
@@ -1129,7 +1129,7 @@
     </p:spTree>
     <p:extLst>
       <p:ext uri="{BB962C8B-B14F-4D97-AF65-F5344CB8AC3E}">
-        <p14:creationId xmlns:p14="http://schemas.microsoft.com/office/powerpoint/2010/main" xmlns="" val="572856973"/>
+        <p14:creationId xmlns="" xmlns:p14="http://schemas.microsoft.com/office/powerpoint/2010/main" val="572856973"/>
       </p:ext>
     </p:extLst>
   </p:cSld>
@@ -1367,7 +1367,7 @@
             <a:fld id="{6B65C960-0237-455E-AA9D-7CD652548A2A}" type="datetimeFigureOut">
               <a:rPr lang="en-US" smtClean="0"/>
               <a:pPr/>
-              <a:t>10/15/2010</a:t>
+              <a:t>10/17/2010</a:t>
             </a:fld>
             <a:endParaRPr lang="en-US"/>
           </a:p>
@@ -1419,7 +1419,7 @@
     </p:spTree>
     <p:extLst>
       <p:ext uri="{BB962C8B-B14F-4D97-AF65-F5344CB8AC3E}">
-        <p14:creationId xmlns:p14="http://schemas.microsoft.com/office/powerpoint/2010/main" xmlns="" val="2159093841"/>
+        <p14:creationId xmlns="" xmlns:p14="http://schemas.microsoft.com/office/powerpoint/2010/main" val="2159093841"/>
       </p:ext>
     </p:extLst>
   </p:cSld>
@@ -1791,7 +1791,7 @@
             <a:fld id="{6B65C960-0237-455E-AA9D-7CD652548A2A}" type="datetimeFigureOut">
               <a:rPr lang="en-US" smtClean="0"/>
               <a:pPr/>
-              <a:t>10/15/2010</a:t>
+              <a:t>10/17/2010</a:t>
             </a:fld>
             <a:endParaRPr lang="en-US"/>
           </a:p>
@@ -1843,7 +1843,7 @@
     </p:spTree>
     <p:extLst>
       <p:ext uri="{BB962C8B-B14F-4D97-AF65-F5344CB8AC3E}">
-        <p14:creationId xmlns:p14="http://schemas.microsoft.com/office/powerpoint/2010/main" xmlns="" val="944408720"/>
+        <p14:creationId xmlns="" xmlns:p14="http://schemas.microsoft.com/office/powerpoint/2010/main" val="944408720"/>
       </p:ext>
     </p:extLst>
   </p:cSld>
@@ -1911,7 +1911,7 @@
             <a:fld id="{6B65C960-0237-455E-AA9D-7CD652548A2A}" type="datetimeFigureOut">
               <a:rPr lang="en-US" smtClean="0"/>
               <a:pPr/>
-              <a:t>10/15/2010</a:t>
+              <a:t>10/17/2010</a:t>
             </a:fld>
             <a:endParaRPr lang="en-US"/>
           </a:p>
@@ -1963,7 +1963,7 @@
     </p:spTree>
     <p:extLst>
       <p:ext uri="{BB962C8B-B14F-4D97-AF65-F5344CB8AC3E}">
-        <p14:creationId xmlns:p14="http://schemas.microsoft.com/office/powerpoint/2010/main" xmlns="" val="1869401353"/>
+        <p14:creationId xmlns="" xmlns:p14="http://schemas.microsoft.com/office/powerpoint/2010/main" val="1869401353"/>
       </p:ext>
     </p:extLst>
   </p:cSld>
@@ -2008,7 +2008,7 @@
             <a:fld id="{6B65C960-0237-455E-AA9D-7CD652548A2A}" type="datetimeFigureOut">
               <a:rPr lang="en-US" smtClean="0"/>
               <a:pPr/>
-              <a:t>10/15/2010</a:t>
+              <a:t>10/17/2010</a:t>
             </a:fld>
             <a:endParaRPr lang="en-US"/>
           </a:p>
@@ -2060,7 +2060,7 @@
     </p:spTree>
     <p:extLst>
       <p:ext uri="{BB962C8B-B14F-4D97-AF65-F5344CB8AC3E}">
-        <p14:creationId xmlns:p14="http://schemas.microsoft.com/office/powerpoint/2010/main" xmlns="" val="883625862"/>
+        <p14:creationId xmlns="" xmlns:p14="http://schemas.microsoft.com/office/powerpoint/2010/main" val="883625862"/>
       </p:ext>
     </p:extLst>
   </p:cSld>
@@ -2287,7 +2287,7 @@
             <a:fld id="{6B65C960-0237-455E-AA9D-7CD652548A2A}" type="datetimeFigureOut">
               <a:rPr lang="en-US" smtClean="0"/>
               <a:pPr/>
-              <a:t>10/15/2010</a:t>
+              <a:t>10/17/2010</a:t>
             </a:fld>
             <a:endParaRPr lang="en-US"/>
           </a:p>
@@ -2339,7 +2339,7 @@
     </p:spTree>
     <p:extLst>
       <p:ext uri="{BB962C8B-B14F-4D97-AF65-F5344CB8AC3E}">
-        <p14:creationId xmlns:p14="http://schemas.microsoft.com/office/powerpoint/2010/main" xmlns="" val="3627303978"/>
+        <p14:creationId xmlns="" xmlns:p14="http://schemas.microsoft.com/office/powerpoint/2010/main" val="3627303978"/>
       </p:ext>
     </p:extLst>
   </p:cSld>
@@ -2542,7 +2542,7 @@
             <a:fld id="{6B65C960-0237-455E-AA9D-7CD652548A2A}" type="datetimeFigureOut">
               <a:rPr lang="en-US" smtClean="0"/>
               <a:pPr/>
-              <a:t>10/15/2010</a:t>
+              <a:t>10/17/2010</a:t>
             </a:fld>
             <a:endParaRPr lang="en-US"/>
           </a:p>
@@ -2594,7 +2594,7 @@
     </p:spTree>
     <p:extLst>
       <p:ext uri="{BB962C8B-B14F-4D97-AF65-F5344CB8AC3E}">
-        <p14:creationId xmlns:p14="http://schemas.microsoft.com/office/powerpoint/2010/main" xmlns="" val="2673529943"/>
+        <p14:creationId xmlns="" xmlns:p14="http://schemas.microsoft.com/office/powerpoint/2010/main" val="2673529943"/>
       </p:ext>
     </p:extLst>
   </p:cSld>
@@ -2769,7 +2769,7 @@
             <a:fld id="{6B65C960-0237-455E-AA9D-7CD652548A2A}" type="datetimeFigureOut">
               <a:rPr lang="en-US" smtClean="0"/>
               <a:pPr/>
-              <a:t>10/15/2010</a:t>
+              <a:t>10/17/2010</a:t>
             </a:fld>
             <a:endParaRPr lang="en-US"/>
           </a:p>
@@ -2857,7 +2857,7 @@
     </p:spTree>
     <p:extLst>
       <p:ext uri="{BB962C8B-B14F-4D97-AF65-F5344CB8AC3E}">
-        <p14:creationId xmlns:p14="http://schemas.microsoft.com/office/powerpoint/2010/main" xmlns="" val="4033793850"/>
+        <p14:creationId xmlns="" xmlns:p14="http://schemas.microsoft.com/office/powerpoint/2010/main" val="4033793850"/>
       </p:ext>
     </p:extLst>
   </p:cSld>
@@ -3233,7 +3233,7 @@
     </p:spTree>
     <p:extLst>
       <p:ext uri="{BB962C8B-B14F-4D97-AF65-F5344CB8AC3E}">
-        <p14:creationId xmlns:p14="http://schemas.microsoft.com/office/powerpoint/2010/main" xmlns="" val="3254071163"/>
+        <p14:creationId xmlns="" xmlns:p14="http://schemas.microsoft.com/office/powerpoint/2010/main" val="3254071163"/>
       </p:ext>
     </p:extLst>
   </p:cSld>
@@ -3407,6 +3407,13 @@
   <p:clrMapOvr>
     <a:masterClrMapping/>
   </p:clrMapOvr>
+  <p:timing>
+    <p:tnLst>
+      <p:par>
+        <p:cTn id="1" dur="indefinite" restart="never" nodeType="tmRoot"/>
+      </p:par>
+    </p:tnLst>
+  </p:timing>
 </p:sld>
 </file>
 
@@ -3485,6 +3492,13 @@
   <p:clrMapOvr>
     <a:masterClrMapping/>
   </p:clrMapOvr>
+  <p:timing>
+    <p:tnLst>
+      <p:par>
+        <p:cTn id="1" dur="indefinite" restart="never" nodeType="tmRoot"/>
+      </p:par>
+    </p:tnLst>
+  </p:timing>
 </p:sld>
 </file>
 
@@ -3563,6 +3577,13 @@
   <p:clrMapOvr>
     <a:masterClrMapping/>
   </p:clrMapOvr>
+  <p:timing>
+    <p:tnLst>
+      <p:par>
+        <p:cTn id="1" dur="indefinite" restart="never" nodeType="tmRoot"/>
+      </p:par>
+    </p:tnLst>
+  </p:timing>
 </p:sld>
 </file>
 
@@ -3641,6 +3662,13 @@
   <p:clrMapOvr>
     <a:masterClrMapping/>
   </p:clrMapOvr>
+  <p:timing>
+    <p:tnLst>
+      <p:par>
+        <p:cTn id="1" dur="indefinite" restart="never" nodeType="tmRoot"/>
+      </p:par>
+    </p:tnLst>
+  </p:timing>
 </p:sld>
 </file>
 
@@ -3719,6 +3747,13 @@
   <p:clrMapOvr>
     <a:masterClrMapping/>
   </p:clrMapOvr>
+  <p:timing>
+    <p:tnLst>
+      <p:par>
+        <p:cTn id="1" dur="indefinite" restart="never" nodeType="tmRoot"/>
+      </p:par>
+    </p:tnLst>
+  </p:timing>
 </p:sld>
 </file>
 
@@ -3915,11 +3950,7 @@
             </a:r>
             <a:r>
               <a:rPr lang="en-US" dirty="0" smtClean="0"/>
-              <a:t> </a:t>
-            </a:r>
-            <a:r>
-              <a:rPr lang="en-US" dirty="0" smtClean="0"/>
-              <a:t>or Eclipse as the IDE</a:t>
+              <a:t> or Eclipse as the IDE</a:t>
             </a:r>
           </a:p>
           <a:p>
@@ -4005,7 +4036,7 @@
           <a:blip r:embed="rId2" cstate="print">
             <a:extLst>
               <a:ext uri="{28A0092B-C50C-407E-A947-70E740481C1C}">
-                <a14:useLocalDpi xmlns:a14="http://schemas.microsoft.com/office/drawing/2010/main" xmlns="" val="0"/>
+                <a14:useLocalDpi xmlns="" xmlns:a14="http://schemas.microsoft.com/office/drawing/2010/main" val="0"/>
               </a:ext>
             </a:extLst>
           </a:blip>
@@ -4015,15 +4046,15 @@
         </p:blipFill>
         <p:spPr>
           <a:xfrm>
-            <a:off x="1586320" y="1219200"/>
-            <a:ext cx="5971361" cy="5315168"/>
+            <a:off x="1361723" y="1143000"/>
+            <a:ext cx="6420555" cy="5715000"/>
           </a:xfrm>
         </p:spPr>
       </p:pic>
     </p:spTree>
     <p:extLst>
       <p:ext uri="{BB962C8B-B14F-4D97-AF65-F5344CB8AC3E}">
-        <p14:creationId xmlns:p14="http://schemas.microsoft.com/office/powerpoint/2010/main" xmlns="" val="2126796741"/>
+        <p14:creationId xmlns="" xmlns:p14="http://schemas.microsoft.com/office/powerpoint/2010/main" val="2126796741"/>
       </p:ext>
     </p:extLst>
   </p:cSld>
@@ -4098,15 +4129,15 @@
         </p:blipFill>
         <p:spPr>
           <a:xfrm>
-            <a:off x="838200" y="1149385"/>
-            <a:ext cx="7574742" cy="5708615"/>
+            <a:off x="0" y="-33267"/>
+            <a:ext cx="9144000" cy="6891268"/>
           </a:xfrm>
         </p:spPr>
       </p:pic>
     </p:spTree>
     <p:extLst>
       <p:ext uri="{BB962C8B-B14F-4D97-AF65-F5344CB8AC3E}">
-        <p14:creationId xmlns:p14="http://schemas.microsoft.com/office/powerpoint/2010/main" xmlns="" val="416510314"/>
+        <p14:creationId xmlns="" xmlns:p14="http://schemas.microsoft.com/office/powerpoint/2010/main" val="416510314"/>
       </p:ext>
     </p:extLst>
   </p:cSld>
@@ -4181,8 +4212,8 @@
         </p:blipFill>
         <p:spPr>
           <a:xfrm>
-            <a:off x="152400" y="1265237"/>
-            <a:ext cx="8766542" cy="5592763"/>
+            <a:off x="0" y="0"/>
+            <a:ext cx="9197030" cy="6858000"/>
           </a:xfrm>
         </p:spPr>
       </p:pic>
@@ -4269,6 +4300,13 @@
   <p:clrMapOvr>
     <a:masterClrMapping/>
   </p:clrMapOvr>
+  <p:timing>
+    <p:tnLst>
+      <p:par>
+        <p:cTn id="1" dur="indefinite" restart="never" nodeType="tmRoot"/>
+      </p:par>
+    </p:tnLst>
+  </p:timing>
 </p:sld>
 </file>
 
@@ -4340,6 +4378,13 @@
   <p:clrMapOvr>
     <a:masterClrMapping/>
   </p:clrMapOvr>
+  <p:timing>
+    <p:tnLst>
+      <p:par>
+        <p:cTn id="1" dur="indefinite" restart="never" nodeType="tmRoot"/>
+      </p:par>
+    </p:tnLst>
+  </p:timing>
 </p:sld>
 </file>
 
@@ -4411,6 +4456,13 @@
   <p:clrMapOvr>
     <a:masterClrMapping/>
   </p:clrMapOvr>
+  <p:timing>
+    <p:tnLst>
+      <p:par>
+        <p:cTn id="1" dur="indefinite" restart="never" nodeType="tmRoot"/>
+      </p:par>
+    </p:tnLst>
+  </p:timing>
 </p:sld>
 </file>
 

</xml_diff>